<commit_message>
- Edit tasklist.exe result parsing algorithm - Add API in PPT
</commit_message>
<xml_diff>
--- a/Monitoring/Flowchart.pptx
+++ b/Monitoring/Flowchart.pptx
@@ -5,7 +5,7 @@
     <p:sldMasterId id="2147483648" r:id="rId1"/>
   </p:sldMasterIdLst>
   <p:notesMasterIdLst>
-    <p:notesMasterId r:id="rId7"/>
+    <p:notesMasterId r:id="rId9"/>
   </p:notesMasterIdLst>
   <p:sldIdLst>
     <p:sldId id="256" r:id="rId2"/>
@@ -13,6 +13,8 @@
     <p:sldId id="260" r:id="rId4"/>
     <p:sldId id="262" r:id="rId5"/>
     <p:sldId id="261" r:id="rId6"/>
+    <p:sldId id="263" r:id="rId7"/>
+    <p:sldId id="264" r:id="rId8"/>
   </p:sldIdLst>
   <p:sldSz cx="9144000" cy="6858000" type="screen4x3"/>
   <p:notesSz cx="6858000" cy="9144000"/>
@@ -8906,6 +8908,50 @@
             <a:r>
               <a:rPr lang="en-US" altLang="ko-KR" dirty="0" smtClean="0"/>
               <a:t>Flow Chart</a:t>
+            </a:r>
+            <a:endParaRPr lang="ko-KR" altLang="en-US" dirty="0"/>
+          </a:p>
+        </p:txBody>
+      </p:sp>
+      <p:sp>
+        <p:nvSpPr>
+          <p:cNvPr id="92" name="순서도: 연결자 91"/>
+          <p:cNvSpPr/>
+          <p:nvPr/>
+        </p:nvSpPr>
+        <p:spPr>
+          <a:xfrm>
+            <a:off x="1187624" y="332656"/>
+            <a:ext cx="216024" cy="216024"/>
+          </a:xfrm>
+          <a:prstGeom prst="flowChartConnector">
+            <a:avLst/>
+          </a:prstGeom>
+        </p:spPr>
+        <p:style>
+          <a:lnRef idx="2">
+            <a:schemeClr val="accent1">
+              <a:shade val="50000"/>
+            </a:schemeClr>
+          </a:lnRef>
+          <a:fillRef idx="1">
+            <a:schemeClr val="accent1"/>
+          </a:fillRef>
+          <a:effectRef idx="0">
+            <a:schemeClr val="accent1"/>
+          </a:effectRef>
+          <a:fontRef idx="minor">
+            <a:schemeClr val="lt1"/>
+          </a:fontRef>
+        </p:style>
+        <p:txBody>
+          <a:bodyPr rtlCol="0" anchor="ctr"/>
+          <a:lstStyle/>
+          <a:p>
+            <a:pPr algn="ctr"/>
+            <a:r>
+              <a:rPr lang="en-US" altLang="ko-KR" dirty="0" smtClean="0"/>
+              <a:t>1</a:t>
             </a:r>
             <a:endParaRPr lang="ko-KR" altLang="en-US" dirty="0"/>
           </a:p>
@@ -11254,7 +11300,19 @@
           <a:p>
             <a:r>
               <a:rPr lang="en-US" altLang="ko-KR" dirty="0" smtClean="0"/>
-              <a:t>File Condition Match</a:t>
+              <a:t>Load </a:t>
+            </a:r>
+            <a:r>
+              <a:rPr lang="en-US" altLang="ko-KR" dirty="0" err="1" smtClean="0"/>
+              <a:t>Config</a:t>
+            </a:r>
+            <a:r>
+              <a:rPr lang="en-US" altLang="ko-KR" dirty="0" smtClean="0"/>
+              <a:t> </a:t>
+            </a:r>
+            <a:r>
+              <a:rPr lang="en-US" altLang="ko-KR" dirty="0" smtClean="0"/>
+              <a:t>File</a:t>
             </a:r>
             <a:endParaRPr lang="ko-KR" altLang="en-US" dirty="0"/>
           </a:p>
@@ -11334,56 +11392,18 @@
           </a:p>
         </p:txBody>
       </p:sp>
-      <p:cxnSp>
-        <p:nvCxnSpPr>
-          <p:cNvPr id="8" name="직선 화살표 연결선 7"/>
-          <p:cNvCxnSpPr>
-            <a:endCxn id="10" idx="0"/>
-          </p:cNvCxnSpPr>
-          <p:nvPr/>
-        </p:nvCxnSpPr>
-        <p:spPr>
-          <a:xfrm>
-            <a:off x="2051720" y="764704"/>
-            <a:ext cx="0" cy="504056"/>
-          </a:xfrm>
-          <a:prstGeom prst="straightConnector1">
-            <a:avLst/>
-          </a:prstGeom>
-          <a:ln w="12700">
-            <a:solidFill>
-              <a:schemeClr val="tx1"/>
-            </a:solidFill>
-            <a:tailEnd type="triangle"/>
-          </a:ln>
-        </p:spPr>
-        <p:style>
-          <a:lnRef idx="1">
-            <a:schemeClr val="accent1"/>
-          </a:lnRef>
-          <a:fillRef idx="0">
-            <a:schemeClr val="accent1"/>
-          </a:fillRef>
-          <a:effectRef idx="0">
-            <a:schemeClr val="accent1"/>
-          </a:effectRef>
-          <a:fontRef idx="minor">
-            <a:schemeClr val="tx1"/>
-          </a:fontRef>
-        </p:style>
-      </p:cxnSp>
-      <p:sp>
-        <p:nvSpPr>
-          <p:cNvPr id="10" name="순서도: 판단 9"/>
+      <p:sp>
+        <p:nvSpPr>
+          <p:cNvPr id="14" name="평행 사변형 13"/>
           <p:cNvSpPr/>
           <p:nvPr/>
         </p:nvSpPr>
         <p:spPr>
           <a:xfrm>
-            <a:off x="899592" y="1268760"/>
-            <a:ext cx="2304256" cy="1008112"/>
-          </a:xfrm>
-          <a:prstGeom prst="flowChartDecision">
+            <a:off x="971600" y="1124744"/>
+            <a:ext cx="1224136" cy="360040"/>
+          </a:xfrm>
+          <a:prstGeom prst="parallelogram">
             <a:avLst/>
           </a:prstGeom>
           <a:noFill/>
@@ -11410,59 +11430,30 @@
           </a:fontRef>
         </p:style>
         <p:txBody>
-          <a:bodyPr rtlCol="0" anchor="ctr"/>
+          <a:bodyPr lIns="36000" tIns="36000" rIns="36000" bIns="36000" rtlCol="0" anchor="ctr"/>
           <a:lstStyle/>
           <a:p>
             <a:pPr algn="ctr"/>
-            <a:r>
-              <a:rPr lang="en-US" altLang="ko-KR" sz="1000" dirty="0" err="1" smtClean="0">
-                <a:solidFill>
-                  <a:schemeClr val="tx1"/>
-                </a:solidFill>
-              </a:rPr>
-              <a:t>objList</a:t>
-            </a:r>
-            <a:r>
-              <a:rPr lang="ko-KR" altLang="en-US" sz="1000" dirty="0" smtClean="0">
-                <a:solidFill>
-                  <a:schemeClr val="tx1"/>
-                </a:solidFill>
-              </a:rPr>
-              <a:t>의 </a:t>
-            </a:r>
             <a:r>
               <a:rPr lang="en-US" altLang="ko-KR" sz="1000" dirty="0" smtClean="0">
                 <a:solidFill>
                   <a:schemeClr val="tx1"/>
                 </a:solidFill>
               </a:rPr>
-              <a:t>Size</a:t>
-            </a:r>
-            <a:r>
-              <a:rPr lang="ko-KR" altLang="en-US" sz="1000" dirty="0" smtClean="0">
-                <a:solidFill>
-                  <a:schemeClr val="tx1"/>
-                </a:solidFill>
-              </a:rPr>
-              <a:t>와 실제 </a:t>
-            </a:r>
+              <a:t>Read 1 Line in</a:t>
+            </a:r>
+          </a:p>
+          <a:p>
+            <a:pPr algn="ctr"/>
             <a:r>
               <a:rPr lang="en-US" altLang="ko-KR" sz="1000" dirty="0" smtClean="0">
                 <a:solidFill>
                   <a:schemeClr val="tx1"/>
                 </a:solidFill>
               </a:rPr>
-              <a:t>File Size</a:t>
-            </a:r>
-            <a:r>
-              <a:rPr lang="ko-KR" altLang="en-US" sz="1000" dirty="0" smtClean="0">
-                <a:solidFill>
-                  <a:schemeClr val="tx1"/>
-                </a:solidFill>
-              </a:rPr>
-              <a:t>비교 후 크기 조건 맞으면</a:t>
-            </a:r>
-            <a:endParaRPr lang="en-US" altLang="ko-KR" sz="1000" dirty="0" smtClean="0">
+              <a:t>CONFIG.TXT</a:t>
+            </a:r>
+            <a:endParaRPr lang="ko-KR" altLang="en-US" sz="1000" dirty="0" smtClean="0">
               <a:solidFill>
                 <a:schemeClr val="tx1"/>
               </a:solidFill>
@@ -11470,56 +11461,18 @@
           </a:p>
         </p:txBody>
       </p:sp>
-      <p:cxnSp>
-        <p:nvCxnSpPr>
-          <p:cNvPr id="13" name="직선 화살표 연결선 12"/>
-          <p:cNvCxnSpPr>
-            <a:stCxn id="10" idx="2"/>
-          </p:cNvCxnSpPr>
-          <p:nvPr/>
-        </p:nvCxnSpPr>
-        <p:spPr>
-          <a:xfrm>
-            <a:off x="2051720" y="2276872"/>
-            <a:ext cx="0" cy="504056"/>
-          </a:xfrm>
-          <a:prstGeom prst="straightConnector1">
-            <a:avLst/>
-          </a:prstGeom>
-          <a:ln w="12700">
-            <a:solidFill>
-              <a:schemeClr val="tx1"/>
-            </a:solidFill>
-            <a:tailEnd type="triangle"/>
-          </a:ln>
-        </p:spPr>
-        <p:style>
-          <a:lnRef idx="1">
-            <a:schemeClr val="accent1"/>
-          </a:lnRef>
-          <a:fillRef idx="0">
-            <a:schemeClr val="accent1"/>
-          </a:fillRef>
-          <a:effectRef idx="0">
-            <a:schemeClr val="accent1"/>
-          </a:effectRef>
-          <a:fontRef idx="minor">
-            <a:schemeClr val="tx1"/>
-          </a:fontRef>
-        </p:style>
-      </p:cxnSp>
-      <p:sp>
-        <p:nvSpPr>
-          <p:cNvPr id="16" name="순서도: 판단 15"/>
+      <p:sp>
+        <p:nvSpPr>
+          <p:cNvPr id="15" name="직사각형 14"/>
           <p:cNvSpPr/>
           <p:nvPr/>
         </p:nvSpPr>
         <p:spPr>
           <a:xfrm>
-            <a:off x="971600" y="3212976"/>
-            <a:ext cx="2304256" cy="1008112"/>
-          </a:xfrm>
-          <a:prstGeom prst="flowChartDecision">
+            <a:off x="935596" y="2564904"/>
+            <a:ext cx="1296144" cy="432048"/>
+          </a:xfrm>
+          <a:prstGeom prst="rect">
             <a:avLst/>
           </a:prstGeom>
           <a:noFill/>
@@ -11551,12 +11504,12 @@
           <a:p>
             <a:pPr algn="ctr"/>
             <a:r>
-              <a:rPr lang="en-US" altLang="ko-KR" sz="1000" dirty="0" err="1" smtClean="0">
+              <a:rPr lang="en-US" altLang="ko-KR" sz="1000" dirty="0" smtClean="0">
                 <a:solidFill>
                   <a:schemeClr val="tx1"/>
                 </a:solidFill>
               </a:rPr>
-              <a:t>objList</a:t>
+              <a:t>Monitoring List</a:t>
             </a:r>
             <a:r>
               <a:rPr lang="ko-KR" altLang="en-US" sz="1000" dirty="0" smtClean="0">
@@ -11564,7 +11517,7 @@
                   <a:schemeClr val="tx1"/>
                 </a:solidFill>
               </a:rPr>
-              <a:t>의 </a:t>
+              <a:t>에 </a:t>
             </a:r>
             <a:r>
               <a:rPr lang="en-US" altLang="ko-KR" sz="1000" dirty="0" smtClean="0">
@@ -11572,7 +11525,7 @@
                   <a:schemeClr val="tx1"/>
                 </a:solidFill>
               </a:rPr>
-              <a:t>Size</a:t>
+              <a:t>line </a:t>
             </a:r>
             <a:r>
               <a:rPr lang="ko-KR" altLang="en-US" sz="1000" dirty="0" smtClean="0">
@@ -11580,142 +11533,23 @@
                   <a:schemeClr val="tx1"/>
                 </a:solidFill>
               </a:rPr>
-              <a:t>와 실제 </a:t>
-            </a:r>
-            <a:r>
-              <a:rPr lang="en-US" altLang="ko-KR" sz="1000" dirty="0" smtClean="0">
-                <a:solidFill>
-                  <a:schemeClr val="tx1"/>
-                </a:solidFill>
-              </a:rPr>
-              <a:t>File Size</a:t>
-            </a:r>
-            <a:r>
-              <a:rPr lang="ko-KR" altLang="en-US" sz="1000" dirty="0" smtClean="0">
-                <a:solidFill>
-                  <a:schemeClr val="tx1"/>
-                </a:solidFill>
-              </a:rPr>
-              <a:t>비교 후 크기 조건 맞으면</a:t>
-            </a:r>
-            <a:endParaRPr lang="en-US" altLang="ko-KR" sz="1000" dirty="0" smtClean="0">
-              <a:solidFill>
-                <a:schemeClr val="tx1"/>
-              </a:solidFill>
-            </a:endParaRPr>
-          </a:p>
-        </p:txBody>
-      </p:sp>
-      <p:sp>
-        <p:nvSpPr>
-          <p:cNvPr id="17" name="TextBox 16"/>
-          <p:cNvSpPr txBox="1"/>
-          <p:nvPr/>
-        </p:nvSpPr>
-        <p:spPr>
-          <a:xfrm>
-            <a:off x="2051720" y="2276872"/>
-            <a:ext cx="288032" cy="215444"/>
-          </a:xfrm>
-          <a:prstGeom prst="rect">
-            <a:avLst/>
-          </a:prstGeom>
-          <a:noFill/>
-        </p:spPr>
-        <p:txBody>
-          <a:bodyPr wrap="square" rtlCol="0">
-            <a:spAutoFit/>
-          </a:bodyPr>
-          <a:lstStyle/>
-          <a:p>
-            <a:r>
-              <a:rPr lang="en-US" altLang="ko-KR" sz="800" dirty="0" smtClean="0"/>
-              <a:t>Y</a:t>
-            </a:r>
-            <a:endParaRPr lang="ko-KR" altLang="en-US" sz="800" dirty="0"/>
-          </a:p>
-        </p:txBody>
-      </p:sp>
-      <p:sp>
-        <p:nvSpPr>
-          <p:cNvPr id="18" name="TextBox 17"/>
-          <p:cNvSpPr txBox="1"/>
-          <p:nvPr/>
-        </p:nvSpPr>
-        <p:spPr>
-          <a:xfrm>
-            <a:off x="611560" y="1556792"/>
-            <a:ext cx="288032" cy="215444"/>
-          </a:xfrm>
-          <a:prstGeom prst="rect">
-            <a:avLst/>
-          </a:prstGeom>
-          <a:noFill/>
-        </p:spPr>
-        <p:txBody>
-          <a:bodyPr wrap="square" rtlCol="0">
-            <a:spAutoFit/>
-          </a:bodyPr>
-          <a:lstStyle/>
-          <a:p>
-            <a:r>
-              <a:rPr lang="en-US" altLang="ko-KR" sz="800" dirty="0" smtClean="0"/>
-              <a:t>N</a:t>
-            </a:r>
-            <a:endParaRPr lang="ko-KR" altLang="en-US" sz="800" dirty="0"/>
-          </a:p>
-        </p:txBody>
-      </p:sp>
-      <p:cxnSp>
-        <p:nvCxnSpPr>
-          <p:cNvPr id="19" name="직선 화살표 연결선 18"/>
-          <p:cNvCxnSpPr>
-            <a:stCxn id="10" idx="1"/>
-          </p:cNvCxnSpPr>
-          <p:nvPr/>
-        </p:nvCxnSpPr>
-        <p:spPr>
-          <a:xfrm flipH="1">
-            <a:off x="251520" y="1772816"/>
-            <a:ext cx="648072" cy="0"/>
-          </a:xfrm>
-          <a:prstGeom prst="straightConnector1">
-            <a:avLst/>
-          </a:prstGeom>
-          <a:ln w="12700">
-            <a:solidFill>
-              <a:schemeClr val="tx1"/>
-            </a:solidFill>
-            <a:tailEnd type="triangle"/>
-          </a:ln>
-        </p:spPr>
-        <p:style>
-          <a:lnRef idx="1">
-            <a:schemeClr val="accent1"/>
-          </a:lnRef>
-          <a:fillRef idx="0">
-            <a:schemeClr val="accent1"/>
-          </a:fillRef>
-          <a:effectRef idx="0">
-            <a:schemeClr val="accent1"/>
-          </a:effectRef>
-          <a:fontRef idx="minor">
-            <a:schemeClr val="tx1"/>
-          </a:fontRef>
-        </p:style>
-      </p:cxnSp>
-      <p:sp>
-        <p:nvSpPr>
-          <p:cNvPr id="14" name="평행 사변형 13"/>
+              <a:t>추가</a:t>
+            </a:r>
+          </a:p>
+        </p:txBody>
+      </p:sp>
+      <p:sp>
+        <p:nvSpPr>
+          <p:cNvPr id="20" name="순서도: 판단 19"/>
           <p:cNvSpPr/>
           <p:nvPr/>
         </p:nvSpPr>
         <p:spPr>
           <a:xfrm>
-            <a:off x="5679122" y="2024843"/>
-            <a:ext cx="1224136" cy="360040"/>
-          </a:xfrm>
-          <a:prstGeom prst="parallelogram">
+            <a:off x="827584" y="1844824"/>
+            <a:ext cx="1512168" cy="438398"/>
+          </a:xfrm>
+          <a:prstGeom prst="flowChartDecision">
             <a:avLst/>
           </a:prstGeom>
           <a:noFill/>
@@ -11742,7 +11576,7 @@
           </a:fontRef>
         </p:style>
         <p:txBody>
-          <a:bodyPr lIns="36000" tIns="36000" rIns="36000" bIns="36000" rtlCol="0" anchor="ctr"/>
+          <a:bodyPr rtlCol="0" anchor="ctr"/>
           <a:lstStyle/>
           <a:p>
             <a:pPr algn="ctr"/>
@@ -11752,18 +11586,7 @@
                   <a:schemeClr val="tx1"/>
                 </a:solidFill>
               </a:rPr>
-              <a:t>Read 1 Line in</a:t>
-            </a:r>
-          </a:p>
-          <a:p>
-            <a:pPr algn="ctr"/>
-            <a:r>
-              <a:rPr lang="en-US" altLang="ko-KR" sz="1000" dirty="0" smtClean="0">
-                <a:solidFill>
-                  <a:schemeClr val="tx1"/>
-                </a:solidFill>
-              </a:rPr>
-              <a:t>CONFIG.TXT</a:t>
+              <a:t>EOF?</a:t>
             </a:r>
             <a:endParaRPr lang="ko-KR" altLang="en-US" sz="1000" dirty="0" smtClean="0">
               <a:solidFill>
@@ -11775,13 +11598,13 @@
       </p:sp>
       <p:sp>
         <p:nvSpPr>
-          <p:cNvPr id="15" name="직사각형 14"/>
+          <p:cNvPr id="21" name="직사각형 20"/>
           <p:cNvSpPr/>
           <p:nvPr/>
         </p:nvSpPr>
         <p:spPr>
           <a:xfrm>
-            <a:off x="5643118" y="3465003"/>
+            <a:off x="935596" y="3212976"/>
             <a:ext cx="1296144" cy="432048"/>
           </a:xfrm>
           <a:prstGeom prst="rect">
@@ -11816,141 +11639,6 @@
           <a:p>
             <a:pPr algn="ctr"/>
             <a:r>
-              <a:rPr lang="en-US" altLang="ko-KR" sz="1000" dirty="0" err="1" smtClean="0">
-                <a:solidFill>
-                  <a:schemeClr val="tx1"/>
-                </a:solidFill>
-              </a:rPr>
-              <a:t>mInfoList</a:t>
-            </a:r>
-            <a:r>
-              <a:rPr lang="ko-KR" altLang="en-US" sz="1000" dirty="0" smtClean="0">
-                <a:solidFill>
-                  <a:schemeClr val="tx1"/>
-                </a:solidFill>
-              </a:rPr>
-              <a:t>에 </a:t>
-            </a:r>
-            <a:r>
-              <a:rPr lang="en-US" altLang="ko-KR" sz="1000" dirty="0" smtClean="0">
-                <a:solidFill>
-                  <a:schemeClr val="tx1"/>
-                </a:solidFill>
-              </a:rPr>
-              <a:t>line </a:t>
-            </a:r>
-            <a:r>
-              <a:rPr lang="ko-KR" altLang="en-US" sz="1000" dirty="0" smtClean="0">
-                <a:solidFill>
-                  <a:schemeClr val="tx1"/>
-                </a:solidFill>
-              </a:rPr>
-              <a:t>추가</a:t>
-            </a:r>
-          </a:p>
-        </p:txBody>
-      </p:sp>
-      <p:sp>
-        <p:nvSpPr>
-          <p:cNvPr id="20" name="순서도: 판단 19"/>
-          <p:cNvSpPr/>
-          <p:nvPr/>
-        </p:nvSpPr>
-        <p:spPr>
-          <a:xfrm>
-            <a:off x="5535106" y="2744923"/>
-            <a:ext cx="1512168" cy="438398"/>
-          </a:xfrm>
-          <a:prstGeom prst="flowChartDecision">
-            <a:avLst/>
-          </a:prstGeom>
-          <a:noFill/>
-          <a:ln w="19050">
-            <a:solidFill>
-              <a:schemeClr val="tx1"/>
-            </a:solidFill>
-          </a:ln>
-        </p:spPr>
-        <p:style>
-          <a:lnRef idx="2">
-            <a:schemeClr val="accent1">
-              <a:shade val="50000"/>
-            </a:schemeClr>
-          </a:lnRef>
-          <a:fillRef idx="1">
-            <a:schemeClr val="accent1"/>
-          </a:fillRef>
-          <a:effectRef idx="0">
-            <a:schemeClr val="accent1"/>
-          </a:effectRef>
-          <a:fontRef idx="minor">
-            <a:schemeClr val="lt1"/>
-          </a:fontRef>
-        </p:style>
-        <p:txBody>
-          <a:bodyPr rtlCol="0" anchor="ctr"/>
-          <a:lstStyle/>
-          <a:p>
-            <a:pPr algn="ctr"/>
-            <a:r>
-              <a:rPr lang="en-US" altLang="ko-KR" sz="1000" dirty="0" smtClean="0">
-                <a:solidFill>
-                  <a:schemeClr val="tx1"/>
-                </a:solidFill>
-              </a:rPr>
-              <a:t>EOF?</a:t>
-            </a:r>
-            <a:endParaRPr lang="ko-KR" altLang="en-US" sz="1000" dirty="0" smtClean="0">
-              <a:solidFill>
-                <a:schemeClr val="tx1"/>
-              </a:solidFill>
-            </a:endParaRPr>
-          </a:p>
-        </p:txBody>
-      </p:sp>
-      <p:sp>
-        <p:nvSpPr>
-          <p:cNvPr id="21" name="직사각형 20"/>
-          <p:cNvSpPr/>
-          <p:nvPr/>
-        </p:nvSpPr>
-        <p:spPr>
-          <a:xfrm>
-            <a:off x="5643118" y="4113075"/>
-            <a:ext cx="1296144" cy="432048"/>
-          </a:xfrm>
-          <a:prstGeom prst="rect">
-            <a:avLst/>
-          </a:prstGeom>
-          <a:noFill/>
-          <a:ln w="19050">
-            <a:solidFill>
-              <a:schemeClr val="tx1"/>
-            </a:solidFill>
-          </a:ln>
-        </p:spPr>
-        <p:style>
-          <a:lnRef idx="2">
-            <a:schemeClr val="accent1">
-              <a:shade val="50000"/>
-            </a:schemeClr>
-          </a:lnRef>
-          <a:fillRef idx="1">
-            <a:schemeClr val="accent1"/>
-          </a:fillRef>
-          <a:effectRef idx="0">
-            <a:schemeClr val="accent1"/>
-          </a:effectRef>
-          <a:fontRef idx="minor">
-            <a:schemeClr val="lt1"/>
-          </a:fontRef>
-        </p:style>
-        <p:txBody>
-          <a:bodyPr rtlCol="0" anchor="ctr"/>
-          <a:lstStyle/>
-          <a:p>
-            <a:pPr algn="ctr"/>
-            <a:r>
               <a:rPr lang="en-US" altLang="ko-KR" sz="1000" dirty="0" smtClean="0">
                 <a:solidFill>
                   <a:schemeClr val="tx1"/>
@@ -11972,7 +11660,7 @@
         </p:nvCxnSpPr>
         <p:spPr>
           <a:xfrm>
-            <a:off x="6291190" y="2384883"/>
+            <a:off x="1583668" y="1484784"/>
             <a:ext cx="0" cy="360040"/>
           </a:xfrm>
           <a:prstGeom prst="straightConnector1">
@@ -12011,7 +11699,7 @@
         </p:nvCxnSpPr>
         <p:spPr>
           <a:xfrm>
-            <a:off x="6291190" y="3183321"/>
+            <a:off x="1583668" y="2283222"/>
             <a:ext cx="0" cy="281682"/>
           </a:xfrm>
           <a:prstGeom prst="straightConnector1">
@@ -12050,7 +11738,7 @@
         </p:nvCxnSpPr>
         <p:spPr>
           <a:xfrm>
-            <a:off x="6291190" y="3897051"/>
+            <a:off x="1583668" y="2996952"/>
             <a:ext cx="0" cy="216024"/>
           </a:xfrm>
           <a:prstGeom prst="straightConnector1">
@@ -12089,7 +11777,7 @@
         </p:nvCxnSpPr>
         <p:spPr>
           <a:xfrm rot="5400000" flipH="1">
-            <a:off x="4837529" y="3091462"/>
+            <a:off x="130007" y="2191363"/>
             <a:ext cx="2340260" cy="567063"/>
           </a:xfrm>
           <a:prstGeom prst="bentConnector4">
@@ -12128,7 +11816,7 @@
         </p:nvSpPr>
         <p:spPr>
           <a:xfrm>
-            <a:off x="6071662" y="3113672"/>
+            <a:off x="1364140" y="2213573"/>
             <a:ext cx="288032" cy="215444"/>
           </a:xfrm>
           <a:prstGeom prst="rect">
@@ -12150,21 +11838,155 @@
           </a:p>
         </p:txBody>
       </p:sp>
-      <p:sp>
-        <p:nvSpPr>
-          <p:cNvPr id="27" name="TextBox 26"/>
+      <p:cxnSp>
+        <p:nvCxnSpPr>
+          <p:cNvPr id="32" name="직선 화살표 연결선 31"/>
+          <p:cNvCxnSpPr/>
+          <p:nvPr/>
+        </p:nvCxnSpPr>
+        <p:spPr>
+          <a:xfrm>
+            <a:off x="1619672" y="764704"/>
+            <a:ext cx="0" cy="360040"/>
+          </a:xfrm>
+          <a:prstGeom prst="straightConnector1">
+            <a:avLst/>
+          </a:prstGeom>
+          <a:ln w="12700">
+            <a:solidFill>
+              <a:schemeClr val="tx1"/>
+            </a:solidFill>
+            <a:tailEnd type="triangle"/>
+          </a:ln>
+        </p:spPr>
+        <p:style>
+          <a:lnRef idx="1">
+            <a:schemeClr val="accent1"/>
+          </a:lnRef>
+          <a:fillRef idx="0">
+            <a:schemeClr val="accent1"/>
+          </a:fillRef>
+          <a:effectRef idx="0">
+            <a:schemeClr val="accent1"/>
+          </a:effectRef>
+          <a:fontRef idx="minor">
+            <a:schemeClr val="tx1"/>
+          </a:fontRef>
+        </p:style>
+      </p:cxnSp>
+      <p:cxnSp>
+        <p:nvCxnSpPr>
+          <p:cNvPr id="33" name="직선 화살표 연결선 32"/>
+          <p:cNvCxnSpPr>
+            <a:stCxn id="20" idx="3"/>
+          </p:cNvCxnSpPr>
+          <p:nvPr/>
+        </p:nvCxnSpPr>
+        <p:spPr>
+          <a:xfrm flipV="1">
+            <a:off x="2339752" y="2061428"/>
+            <a:ext cx="342622" cy="2595"/>
+          </a:xfrm>
+          <a:prstGeom prst="straightConnector1">
+            <a:avLst/>
+          </a:prstGeom>
+          <a:ln w="12700">
+            <a:solidFill>
+              <a:schemeClr val="tx1"/>
+            </a:solidFill>
+            <a:tailEnd type="triangle"/>
+          </a:ln>
+        </p:spPr>
+        <p:style>
+          <a:lnRef idx="1">
+            <a:schemeClr val="accent1"/>
+          </a:lnRef>
+          <a:fillRef idx="0">
+            <a:schemeClr val="accent1"/>
+          </a:fillRef>
+          <a:effectRef idx="0">
+            <a:schemeClr val="accent1"/>
+          </a:effectRef>
+          <a:fontRef idx="minor">
+            <a:schemeClr val="tx1"/>
+          </a:fontRef>
+        </p:style>
+      </p:cxnSp>
+      <p:sp>
+        <p:nvSpPr>
+          <p:cNvPr id="37" name="TextBox 36"/>
           <p:cNvSpPr txBox="1"/>
           <p:nvPr/>
         </p:nvSpPr>
         <p:spPr>
           <a:xfrm>
-            <a:off x="6920676" y="2744923"/>
-            <a:ext cx="288032" cy="215444"/>
+            <a:off x="2267744" y="1916832"/>
+            <a:ext cx="144016" cy="123111"/>
           </a:xfrm>
           <a:prstGeom prst="rect">
             <a:avLst/>
           </a:prstGeom>
           <a:noFill/>
+        </p:spPr>
+        <p:txBody>
+          <a:bodyPr wrap="square" lIns="0" tIns="0" rIns="0" bIns="0" rtlCol="0">
+            <a:spAutoFit/>
+          </a:bodyPr>
+          <a:lstStyle/>
+          <a:p>
+            <a:r>
+              <a:rPr lang="en-US" altLang="ko-KR" sz="800" dirty="0" smtClean="0"/>
+              <a:t>Y</a:t>
+            </a:r>
+            <a:endParaRPr lang="ko-KR" altLang="en-US" sz="800" dirty="0"/>
+          </a:p>
+        </p:txBody>
+      </p:sp>
+    </p:spTree>
+  </p:cSld>
+  <p:clrMapOvr>
+    <a:masterClrMapping/>
+  </p:clrMapOvr>
+</p:sld>
+</file>
+
+<file path=ppt/slides/slide6.xml><?xml version="1.0" encoding="utf-8"?>
+<p:sld xmlns:a="http://schemas.openxmlformats.org/drawingml/2006/main" xmlns:r="http://schemas.openxmlformats.org/officeDocument/2006/relationships" xmlns:p="http://schemas.openxmlformats.org/presentationml/2006/main">
+  <p:cSld>
+    <p:spTree>
+      <p:nvGrpSpPr>
+        <p:cNvPr id="1" name=""/>
+        <p:cNvGrpSpPr/>
+        <p:nvPr/>
+      </p:nvGrpSpPr>
+      <p:grpSpPr>
+        <a:xfrm>
+          <a:off x="0" y="0"/>
+          <a:ext cx="0" cy="0"/>
+          <a:chOff x="0" y="0"/>
+          <a:chExt cx="0" cy="0"/>
+        </a:xfrm>
+      </p:grpSpPr>
+      <p:sp>
+        <p:nvSpPr>
+          <p:cNvPr id="4" name="TextBox 3"/>
+          <p:cNvSpPr txBox="1"/>
+          <p:nvPr/>
+        </p:nvSpPr>
+        <p:spPr>
+          <a:xfrm>
+            <a:off x="6948264" y="188640"/>
+            <a:ext cx="1944216" cy="369332"/>
+          </a:xfrm>
+          <a:prstGeom prst="rect">
+            <a:avLst/>
+          </a:prstGeom>
+          <a:noFill/>
+          <a:ln>
+            <a:solidFill>
+              <a:schemeClr val="tx1"/>
+            </a:solidFill>
+          </a:ln>
         </p:spPr>
         <p:txBody>
           <a:bodyPr wrap="square" rtlCol="0">
@@ -12172,11 +11994,1090 @@
           </a:bodyPr>
           <a:lstStyle/>
           <a:p>
-            <a:r>
-              <a:rPr lang="en-US" altLang="ko-KR" sz="800" dirty="0" smtClean="0"/>
-              <a:t>Y</a:t>
-            </a:r>
-            <a:endParaRPr lang="ko-KR" altLang="en-US" sz="800" dirty="0"/>
+            <a:pPr algn="ctr"/>
+            <a:r>
+              <a:rPr lang="ko-KR" altLang="en-US" dirty="0" smtClean="0"/>
+              <a:t>주요 </a:t>
+            </a:r>
+            <a:r>
+              <a:rPr lang="en-US" altLang="ko-KR" dirty="0" smtClean="0"/>
+              <a:t>API</a:t>
+            </a:r>
+            <a:endParaRPr lang="ko-KR" altLang="en-US" dirty="0"/>
+          </a:p>
+        </p:txBody>
+      </p:sp>
+      <p:sp>
+        <p:nvSpPr>
+          <p:cNvPr id="5" name="TextBox 4"/>
+          <p:cNvSpPr txBox="1"/>
+          <p:nvPr/>
+        </p:nvSpPr>
+        <p:spPr>
+          <a:xfrm>
+            <a:off x="395536" y="620688"/>
+            <a:ext cx="8280920" cy="2246769"/>
+          </a:xfrm>
+          <a:prstGeom prst="rect">
+            <a:avLst/>
+          </a:prstGeom>
+          <a:noFill/>
+        </p:spPr>
+        <p:txBody>
+          <a:bodyPr wrap="square" rtlCol="0">
+            <a:spAutoFit/>
+          </a:bodyPr>
+          <a:lstStyle/>
+          <a:p>
+            <a:pPr>
+              <a:buFont typeface="Wingdings" pitchFamily="2" charset="2"/>
+              <a:buChar char="u"/>
+            </a:pPr>
+            <a:r>
+              <a:rPr lang="ko-KR" altLang="en-US" sz="1000" dirty="0" smtClean="0"/>
+              <a:t> 외부 프로그램 실행 및 콘솔 출력 가져오기</a:t>
+            </a:r>
+            <a:endParaRPr lang="en-US" altLang="ko-KR" sz="1000" dirty="0" smtClean="0"/>
+          </a:p>
+          <a:p>
+            <a:r>
+              <a:rPr lang="en-US" altLang="ko-KR" sz="1000" dirty="0" smtClean="0"/>
+              <a:t> </a:t>
+            </a:r>
+            <a:r>
+              <a:rPr lang="en-US" altLang="ko-KR" sz="1000" dirty="0" err="1" smtClean="0"/>
+              <a:t>ProcessStartInfo</a:t>
+            </a:r>
+            <a:r>
+              <a:rPr lang="en-US" altLang="ko-KR" sz="1000" dirty="0" smtClean="0"/>
+              <a:t> start = new </a:t>
+            </a:r>
+            <a:r>
+              <a:rPr lang="en-US" altLang="ko-KR" sz="1000" b="1" dirty="0" err="1" smtClean="0"/>
+              <a:t>ProcessStartInfo</a:t>
+            </a:r>
+            <a:r>
+              <a:rPr lang="en-US" altLang="ko-KR" sz="1000" dirty="0" smtClean="0"/>
+              <a:t>();</a:t>
+            </a:r>
+          </a:p>
+          <a:p>
+            <a:r>
+              <a:rPr lang="en-US" altLang="ko-KR" sz="1000" dirty="0" smtClean="0"/>
+              <a:t> </a:t>
+            </a:r>
+            <a:r>
+              <a:rPr lang="en-US" altLang="ko-KR" sz="1000" dirty="0" err="1" smtClean="0"/>
+              <a:t>start.FileName</a:t>
+            </a:r>
+            <a:r>
+              <a:rPr lang="en-US" altLang="ko-KR" sz="1000" dirty="0" smtClean="0"/>
+              <a:t> = "tasklist.exe";</a:t>
+            </a:r>
+          </a:p>
+          <a:p>
+            <a:r>
+              <a:rPr lang="en-US" altLang="ko-KR" sz="1000" dirty="0" smtClean="0"/>
+              <a:t> </a:t>
+            </a:r>
+            <a:r>
+              <a:rPr lang="en-US" altLang="ko-KR" sz="1000" dirty="0" err="1" smtClean="0"/>
+              <a:t>start.UseShellExecute</a:t>
+            </a:r>
+            <a:r>
+              <a:rPr lang="en-US" altLang="ko-KR" sz="1000" dirty="0" smtClean="0"/>
+              <a:t> = false;</a:t>
+            </a:r>
+          </a:p>
+          <a:p>
+            <a:r>
+              <a:rPr lang="en-US" altLang="ko-KR" sz="1000" dirty="0" smtClean="0"/>
+              <a:t> </a:t>
+            </a:r>
+            <a:r>
+              <a:rPr lang="en-US" altLang="ko-KR" sz="1000" dirty="0" err="1" smtClean="0"/>
+              <a:t>start.RedirectStandardOutput</a:t>
+            </a:r>
+            <a:r>
+              <a:rPr lang="en-US" altLang="ko-KR" sz="1000" dirty="0" smtClean="0"/>
+              <a:t> = true;</a:t>
+            </a:r>
+          </a:p>
+          <a:p>
+            <a:r>
+              <a:rPr lang="en-US" altLang="ko-KR" sz="1000" dirty="0" smtClean="0"/>
+              <a:t> </a:t>
+            </a:r>
+            <a:r>
+              <a:rPr lang="en-US" altLang="ko-KR" sz="1000" dirty="0" err="1" smtClean="0"/>
+              <a:t>start.CreateNoWindow</a:t>
+            </a:r>
+            <a:r>
+              <a:rPr lang="en-US" altLang="ko-KR" sz="1000" dirty="0" smtClean="0"/>
+              <a:t> = true;</a:t>
+            </a:r>
+          </a:p>
+          <a:p>
+            <a:endParaRPr lang="en-US" altLang="ko-KR" sz="1000" dirty="0" smtClean="0"/>
+          </a:p>
+          <a:p>
+            <a:r>
+              <a:rPr lang="en-US" altLang="ko-KR" sz="1000" dirty="0" smtClean="0"/>
+              <a:t> Process </a:t>
+            </a:r>
+            <a:r>
+              <a:rPr lang="en-US" altLang="ko-KR" sz="1000" dirty="0" err="1" smtClean="0"/>
+              <a:t>process</a:t>
+            </a:r>
+            <a:r>
+              <a:rPr lang="en-US" altLang="ko-KR" sz="1000" dirty="0" smtClean="0"/>
+              <a:t> = </a:t>
+            </a:r>
+            <a:r>
+              <a:rPr lang="en-US" altLang="ko-KR" sz="1000" b="1" dirty="0" err="1" smtClean="0"/>
+              <a:t>Process.Start</a:t>
+            </a:r>
+            <a:r>
+              <a:rPr lang="en-US" altLang="ko-KR" sz="1000" dirty="0" smtClean="0"/>
+              <a:t>(start);         // exe </a:t>
+            </a:r>
+            <a:r>
+              <a:rPr lang="ko-KR" altLang="en-US" sz="1000" dirty="0" err="1" smtClean="0"/>
+              <a:t>실행시</a:t>
+            </a:r>
+            <a:endParaRPr lang="ko-KR" altLang="en-US" sz="1000" dirty="0" smtClean="0"/>
+          </a:p>
+          <a:p>
+            <a:r>
+              <a:rPr lang="ko-KR" altLang="en-US" sz="1000" dirty="0" smtClean="0"/>
+              <a:t> </a:t>
+            </a:r>
+            <a:r>
+              <a:rPr lang="en-US" altLang="ko-KR" sz="1000" dirty="0" err="1" smtClean="0"/>
+              <a:t>StreamReader</a:t>
+            </a:r>
+            <a:r>
+              <a:rPr lang="en-US" altLang="ko-KR" sz="1000" dirty="0" smtClean="0"/>
+              <a:t> reader = </a:t>
+            </a:r>
+            <a:r>
+              <a:rPr lang="en-US" altLang="ko-KR" sz="1000" dirty="0" err="1" smtClean="0"/>
+              <a:t>process.StandardOutput</a:t>
+            </a:r>
+            <a:r>
+              <a:rPr lang="en-US" altLang="ko-KR" sz="1000" dirty="0" smtClean="0"/>
+              <a:t>;   // </a:t>
+            </a:r>
+            <a:r>
+              <a:rPr lang="ko-KR" altLang="en-US" sz="1000" dirty="0" smtClean="0"/>
+              <a:t>출력되는 값을 가져오기 위해 </a:t>
+            </a:r>
+            <a:r>
+              <a:rPr lang="en-US" altLang="ko-KR" sz="1000" dirty="0" err="1" smtClean="0"/>
+              <a:t>StreamReader</a:t>
+            </a:r>
+            <a:r>
+              <a:rPr lang="ko-KR" altLang="en-US" sz="1000" dirty="0" smtClean="0"/>
+              <a:t>에 연결  </a:t>
+            </a:r>
+          </a:p>
+          <a:p>
+            <a:r>
+              <a:rPr lang="ko-KR" altLang="en-US" sz="1000" dirty="0" smtClean="0"/>
+              <a:t> </a:t>
+            </a:r>
+            <a:r>
+              <a:rPr lang="en-US" altLang="ko-KR" sz="1000" dirty="0" smtClean="0"/>
+              <a:t>while (true)</a:t>
+            </a:r>
+          </a:p>
+          <a:p>
+            <a:r>
+              <a:rPr lang="en-US" altLang="ko-KR" sz="1000" dirty="0" smtClean="0"/>
+              <a:t> </a:t>
+            </a:r>
+            <a:r>
+              <a:rPr lang="en-US" altLang="ko-KR" sz="1000" dirty="0" smtClean="0"/>
+              <a:t>{</a:t>
+            </a:r>
+          </a:p>
+          <a:p>
+            <a:r>
+              <a:rPr lang="en-US" altLang="ko-KR" sz="1000" dirty="0" smtClean="0"/>
+              <a:t>     string </a:t>
+            </a:r>
+            <a:r>
+              <a:rPr lang="en-US" altLang="ko-KR" sz="1000" dirty="0" smtClean="0"/>
+              <a:t>line = </a:t>
+            </a:r>
+            <a:r>
+              <a:rPr lang="en-US" altLang="ko-KR" sz="1000" dirty="0" err="1" smtClean="0"/>
+              <a:t>reader.ReadLine</a:t>
+            </a:r>
+            <a:r>
+              <a:rPr lang="en-US" altLang="ko-KR" sz="1000" dirty="0" smtClean="0"/>
+              <a:t>();            // </a:t>
+            </a:r>
+            <a:r>
+              <a:rPr lang="ko-KR" altLang="en-US" sz="1000" dirty="0" err="1" smtClean="0"/>
+              <a:t>출력값의</a:t>
+            </a:r>
+            <a:r>
+              <a:rPr lang="ko-KR" altLang="en-US" sz="1000" dirty="0" smtClean="0"/>
+              <a:t> 한 라인을 읽는다 </a:t>
+            </a:r>
+            <a:endParaRPr lang="en-US" altLang="ko-KR" sz="1000" dirty="0" smtClean="0"/>
+          </a:p>
+          <a:p>
+            <a:r>
+              <a:rPr lang="en-US" altLang="ko-KR" sz="1000" dirty="0" smtClean="0"/>
+              <a:t>      …</a:t>
+            </a:r>
+          </a:p>
+          <a:p>
+            <a:r>
+              <a:rPr lang="en-US" altLang="ko-KR" sz="1000" dirty="0" smtClean="0"/>
+              <a:t> }</a:t>
+            </a:r>
+            <a:endParaRPr lang="ko-KR" altLang="en-US" sz="1000" dirty="0"/>
+          </a:p>
+        </p:txBody>
+      </p:sp>
+      <p:sp>
+        <p:nvSpPr>
+          <p:cNvPr id="6" name="TextBox 5"/>
+          <p:cNvSpPr txBox="1"/>
+          <p:nvPr/>
+        </p:nvSpPr>
+        <p:spPr>
+          <a:xfrm>
+            <a:off x="395536" y="3068960"/>
+            <a:ext cx="8280920" cy="3323987"/>
+          </a:xfrm>
+          <a:prstGeom prst="rect">
+            <a:avLst/>
+          </a:prstGeom>
+          <a:noFill/>
+        </p:spPr>
+        <p:txBody>
+          <a:bodyPr wrap="square" rtlCol="0">
+            <a:spAutoFit/>
+          </a:bodyPr>
+          <a:lstStyle/>
+          <a:p>
+            <a:pPr>
+              <a:buFont typeface="Wingdings" pitchFamily="2" charset="2"/>
+              <a:buChar char="u"/>
+            </a:pPr>
+            <a:r>
+              <a:rPr lang="ko-KR" altLang="en-US" sz="1000" dirty="0" smtClean="0"/>
+              <a:t> </a:t>
+            </a:r>
+            <a:r>
+              <a:rPr lang="en-US" altLang="ko-KR" sz="1000" dirty="0" smtClean="0"/>
+              <a:t>Process </a:t>
+            </a:r>
+            <a:r>
+              <a:rPr lang="ko-KR" altLang="en-US" sz="1000" dirty="0" smtClean="0"/>
+              <a:t>정보 읽어서 메모리 사용량 얻어오기</a:t>
+            </a:r>
+            <a:endParaRPr lang="en-US" altLang="ko-KR" sz="1000" dirty="0" smtClean="0"/>
+          </a:p>
+          <a:p>
+            <a:r>
+              <a:rPr lang="ko-KR" altLang="en-US" sz="1000" dirty="0" smtClean="0"/>
+              <a:t> </a:t>
+            </a:r>
+            <a:r>
+              <a:rPr lang="en-US" altLang="ko-KR" sz="1000" dirty="0" smtClean="0"/>
+              <a:t>Process[] all =</a:t>
+            </a:r>
+            <a:r>
+              <a:rPr lang="en-US" altLang="ko-KR" sz="1000" b="1" dirty="0" smtClean="0"/>
+              <a:t> </a:t>
+            </a:r>
+            <a:r>
+              <a:rPr lang="en-US" altLang="ko-KR" sz="1000" b="1" dirty="0" err="1" smtClean="0"/>
+              <a:t>Process.GetProcessesByName</a:t>
+            </a:r>
+            <a:r>
+              <a:rPr lang="en-US" altLang="ko-KR" sz="1000" b="1" dirty="0" smtClean="0"/>
+              <a:t>(“PROG01");</a:t>
+            </a:r>
+            <a:r>
+              <a:rPr lang="en-US" altLang="ko-KR" sz="1000" b="1" dirty="0" smtClean="0"/>
+              <a:t> </a:t>
+            </a:r>
+            <a:r>
+              <a:rPr lang="en-US" altLang="ko-KR" sz="1000" dirty="0" smtClean="0"/>
+              <a:t/>
+            </a:r>
+            <a:br>
+              <a:rPr lang="en-US" altLang="ko-KR" sz="1000" dirty="0" smtClean="0"/>
+            </a:br>
+            <a:r>
+              <a:rPr lang="en-US" altLang="ko-KR" sz="1000" dirty="0" smtClean="0"/>
+              <a:t> </a:t>
+            </a:r>
+            <a:r>
+              <a:rPr lang="en-US" altLang="ko-KR" sz="1000" dirty="0" err="1" smtClean="0"/>
+              <a:t>foreach</a:t>
+            </a:r>
+            <a:r>
+              <a:rPr lang="en-US" altLang="ko-KR" sz="1000" dirty="0" smtClean="0"/>
+              <a:t> (Process </a:t>
+            </a:r>
+            <a:r>
+              <a:rPr lang="en-US" altLang="ko-KR" sz="1000" dirty="0" err="1" smtClean="0"/>
+              <a:t>thisProc</a:t>
+            </a:r>
+            <a:r>
+              <a:rPr lang="en-US" altLang="ko-KR" sz="1000" dirty="0" smtClean="0"/>
+              <a:t> in </a:t>
+            </a:r>
+            <a:r>
+              <a:rPr lang="en-US" altLang="ko-KR" sz="1000" dirty="0" err="1" smtClean="0"/>
+              <a:t>all.OrderBy</a:t>
+            </a:r>
+            <a:r>
+              <a:rPr lang="en-US" altLang="ko-KR" sz="1000" dirty="0" smtClean="0"/>
+              <a:t>(x =&gt; </a:t>
+            </a:r>
+            <a:r>
+              <a:rPr lang="en-US" altLang="ko-KR" sz="1000" dirty="0" err="1" smtClean="0"/>
+              <a:t>x.ProcessName</a:t>
+            </a:r>
+            <a:r>
+              <a:rPr lang="en-US" altLang="ko-KR" sz="1000" dirty="0" smtClean="0"/>
+              <a:t>)) </a:t>
+            </a:r>
+            <a:br>
+              <a:rPr lang="en-US" altLang="ko-KR" sz="1000" dirty="0" smtClean="0"/>
+            </a:br>
+            <a:r>
+              <a:rPr lang="en-US" altLang="ko-KR" sz="1000" dirty="0" smtClean="0"/>
+              <a:t> { </a:t>
+            </a:r>
+            <a:br>
+              <a:rPr lang="en-US" altLang="ko-KR" sz="1000" dirty="0" smtClean="0"/>
+            </a:br>
+            <a:r>
+              <a:rPr lang="en-US" altLang="ko-KR" sz="1000" dirty="0" smtClean="0"/>
+              <a:t>    string Name = </a:t>
+            </a:r>
+            <a:r>
+              <a:rPr lang="en-US" altLang="ko-KR" sz="1000" dirty="0" err="1" smtClean="0"/>
+              <a:t>thisProc.ProcessName</a:t>
+            </a:r>
+            <a:r>
+              <a:rPr lang="en-US" altLang="ko-KR" sz="1000" dirty="0" smtClean="0"/>
+              <a:t>; </a:t>
+            </a:r>
+            <a:br>
+              <a:rPr lang="en-US" altLang="ko-KR" sz="1000" dirty="0" smtClean="0"/>
+            </a:br>
+            <a:r>
+              <a:rPr lang="en-US" altLang="ko-KR" sz="1000" dirty="0" smtClean="0"/>
+              <a:t>    </a:t>
+            </a:r>
+            <a:r>
+              <a:rPr lang="en-US" altLang="ko-KR" sz="1000" dirty="0" err="1" smtClean="0"/>
+              <a:t>Console.WriteLine</a:t>
+            </a:r>
+            <a:r>
+              <a:rPr lang="en-US" altLang="ko-KR" sz="1000" dirty="0" smtClean="0"/>
+              <a:t>("Name : " + Name); </a:t>
+            </a:r>
+            <a:br>
+              <a:rPr lang="en-US" altLang="ko-KR" sz="1000" dirty="0" smtClean="0"/>
+            </a:br>
+            <a:r>
+              <a:rPr lang="en-US" altLang="ko-KR" sz="1000" dirty="0" smtClean="0"/>
+              <a:t> </a:t>
+            </a:r>
+            <a:r>
+              <a:rPr lang="en-US" altLang="ko-KR" sz="1000" dirty="0" smtClean="0"/>
+              <a:t>   </a:t>
+            </a:r>
+            <a:r>
+              <a:rPr lang="en-US" altLang="ko-KR" sz="1000" dirty="0" err="1" smtClean="0"/>
+              <a:t>Console.WriteLine</a:t>
+            </a:r>
+            <a:r>
+              <a:rPr lang="en-US" altLang="ko-KR" sz="1000" dirty="0" smtClean="0"/>
+              <a:t>("NonpagedSystemMemorySize64 : " + thisProc.NonpagedSystemMemorySize64); </a:t>
+            </a:r>
+            <a:br>
+              <a:rPr lang="en-US" altLang="ko-KR" sz="1000" dirty="0" smtClean="0"/>
+            </a:br>
+            <a:r>
+              <a:rPr lang="en-US" altLang="ko-KR" sz="1000" dirty="0" smtClean="0"/>
+              <a:t>    </a:t>
+            </a:r>
+            <a:r>
+              <a:rPr lang="en-US" altLang="ko-KR" sz="1000" dirty="0" err="1" smtClean="0"/>
+              <a:t>Console.WriteLine</a:t>
+            </a:r>
+            <a:r>
+              <a:rPr lang="en-US" altLang="ko-KR" sz="1000" dirty="0" smtClean="0"/>
+              <a:t>("PagedMemorySize64 : " + thisProc.PagedMemorySize64); </a:t>
+            </a:r>
+            <a:br>
+              <a:rPr lang="en-US" altLang="ko-KR" sz="1000" dirty="0" smtClean="0"/>
+            </a:br>
+            <a:r>
+              <a:rPr lang="en-US" altLang="ko-KR" sz="1000" dirty="0" smtClean="0"/>
+              <a:t>    </a:t>
+            </a:r>
+            <a:r>
+              <a:rPr lang="en-US" altLang="ko-KR" sz="1000" dirty="0" err="1" smtClean="0"/>
+              <a:t>Console.WriteLine</a:t>
+            </a:r>
+            <a:r>
+              <a:rPr lang="en-US" altLang="ko-KR" sz="1000" dirty="0" smtClean="0"/>
+              <a:t>("PagedSystemMemorySize64 : " + thisProc.PagedSystemMemorySize64); </a:t>
+            </a:r>
+            <a:br>
+              <a:rPr lang="en-US" altLang="ko-KR" sz="1000" dirty="0" smtClean="0"/>
+            </a:br>
+            <a:r>
+              <a:rPr lang="en-US" altLang="ko-KR" sz="1000" dirty="0" smtClean="0"/>
+              <a:t>    </a:t>
+            </a:r>
+            <a:r>
+              <a:rPr lang="en-US" altLang="ko-KR" sz="1000" dirty="0" err="1" smtClean="0"/>
+              <a:t>Console.WriteLine</a:t>
+            </a:r>
+            <a:r>
+              <a:rPr lang="en-US" altLang="ko-KR" sz="1000" dirty="0" smtClean="0"/>
+              <a:t>("PeakPagedMemorySize64 : " + thisProc.PeakPagedMemorySize64); </a:t>
+            </a:r>
+            <a:br>
+              <a:rPr lang="en-US" altLang="ko-KR" sz="1000" dirty="0" smtClean="0"/>
+            </a:br>
+            <a:r>
+              <a:rPr lang="en-US" altLang="ko-KR" sz="1000" dirty="0" smtClean="0"/>
+              <a:t>    </a:t>
+            </a:r>
+            <a:r>
+              <a:rPr lang="en-US" altLang="ko-KR" sz="1000" dirty="0" err="1" smtClean="0"/>
+              <a:t>Console.WriteLine</a:t>
+            </a:r>
+            <a:r>
+              <a:rPr lang="en-US" altLang="ko-KR" sz="1000" dirty="0" smtClean="0"/>
+              <a:t>("PeakVirtualMemorySize64 : " + thisProc.PeakVirtualMemorySize64); </a:t>
+            </a:r>
+            <a:br>
+              <a:rPr lang="en-US" altLang="ko-KR" sz="1000" dirty="0" smtClean="0"/>
+            </a:br>
+            <a:r>
+              <a:rPr lang="en-US" altLang="ko-KR" sz="1000" dirty="0" smtClean="0"/>
+              <a:t>    </a:t>
+            </a:r>
+            <a:r>
+              <a:rPr lang="en-US" altLang="ko-KR" sz="1000" dirty="0" err="1" smtClean="0"/>
+              <a:t>Console.WriteLine</a:t>
+            </a:r>
+            <a:r>
+              <a:rPr lang="en-US" altLang="ko-KR" sz="1000" dirty="0" smtClean="0"/>
+              <a:t>("PeakWorkingSet64 : " + thisProc.PeakWorkingSet64); </a:t>
+            </a:r>
+            <a:br>
+              <a:rPr lang="en-US" altLang="ko-KR" sz="1000" dirty="0" smtClean="0"/>
+            </a:br>
+            <a:r>
+              <a:rPr lang="en-US" altLang="ko-KR" sz="1000" dirty="0" smtClean="0"/>
+              <a:t>    </a:t>
+            </a:r>
+            <a:r>
+              <a:rPr lang="en-US" altLang="ko-KR" sz="1000" dirty="0" err="1" smtClean="0"/>
+              <a:t>Console.WriteLine</a:t>
+            </a:r>
+            <a:r>
+              <a:rPr lang="en-US" altLang="ko-KR" sz="1000" dirty="0" smtClean="0"/>
+              <a:t>("PrivateMemorySize64 : " + thisProc.PrivateMemorySize64); </a:t>
+            </a:r>
+            <a:br>
+              <a:rPr lang="en-US" altLang="ko-KR" sz="1000" dirty="0" smtClean="0"/>
+            </a:br>
+            <a:r>
+              <a:rPr lang="en-US" altLang="ko-KR" sz="1000" dirty="0" smtClean="0"/>
+              <a:t>    </a:t>
+            </a:r>
+            <a:r>
+              <a:rPr lang="en-US" altLang="ko-KR" sz="1000" dirty="0" err="1" smtClean="0"/>
+              <a:t>Console.WriteLine</a:t>
+            </a:r>
+            <a:r>
+              <a:rPr lang="en-US" altLang="ko-KR" sz="1000" dirty="0" smtClean="0"/>
+              <a:t>("</a:t>
+            </a:r>
+            <a:r>
+              <a:rPr lang="en-US" altLang="ko-KR" sz="1000" dirty="0" err="1" smtClean="0"/>
+              <a:t>PrivilegedProcessorTime</a:t>
+            </a:r>
+            <a:r>
+              <a:rPr lang="en-US" altLang="ko-KR" sz="1000" dirty="0" smtClean="0"/>
+              <a:t> : " + </a:t>
+            </a:r>
+            <a:r>
+              <a:rPr lang="en-US" altLang="ko-KR" sz="1000" dirty="0" err="1" smtClean="0"/>
+              <a:t>thisProc.PrivilegedProcessorTime</a:t>
+            </a:r>
+            <a:r>
+              <a:rPr lang="en-US" altLang="ko-KR" sz="1000" dirty="0" smtClean="0"/>
+              <a:t>); </a:t>
+            </a:r>
+            <a:br>
+              <a:rPr lang="en-US" altLang="ko-KR" sz="1000" dirty="0" smtClean="0"/>
+            </a:br>
+            <a:r>
+              <a:rPr lang="en-US" altLang="ko-KR" sz="1000" dirty="0" smtClean="0"/>
+              <a:t>    </a:t>
+            </a:r>
+            <a:r>
+              <a:rPr lang="en-US" altLang="ko-KR" sz="1000" dirty="0" err="1" smtClean="0"/>
+              <a:t>Console.WriteLine</a:t>
+            </a:r>
+            <a:r>
+              <a:rPr lang="en-US" altLang="ko-KR" sz="1000" dirty="0" smtClean="0"/>
+              <a:t>("</a:t>
+            </a:r>
+            <a:r>
+              <a:rPr lang="en-US" altLang="ko-KR" sz="1000" dirty="0" err="1" smtClean="0"/>
+              <a:t>ProcessorAffinity</a:t>
+            </a:r>
+            <a:r>
+              <a:rPr lang="en-US" altLang="ko-KR" sz="1000" dirty="0" smtClean="0"/>
+              <a:t> : " + </a:t>
+            </a:r>
+            <a:r>
+              <a:rPr lang="en-US" altLang="ko-KR" sz="1000" dirty="0" err="1" smtClean="0"/>
+              <a:t>thisProc.ProcessorAffinity</a:t>
+            </a:r>
+            <a:r>
+              <a:rPr lang="en-US" altLang="ko-KR" sz="1000" dirty="0" smtClean="0"/>
+              <a:t>); </a:t>
+            </a:r>
+            <a:br>
+              <a:rPr lang="en-US" altLang="ko-KR" sz="1000" dirty="0" smtClean="0"/>
+            </a:br>
+            <a:r>
+              <a:rPr lang="en-US" altLang="ko-KR" sz="1000" dirty="0" smtClean="0"/>
+              <a:t>    </a:t>
+            </a:r>
+            <a:r>
+              <a:rPr lang="en-US" altLang="ko-KR" sz="1000" dirty="0" err="1" smtClean="0"/>
+              <a:t>Console.WriteLine</a:t>
+            </a:r>
+            <a:r>
+              <a:rPr lang="en-US" altLang="ko-KR" sz="1000" dirty="0" smtClean="0"/>
+              <a:t>("</a:t>
+            </a:r>
+            <a:r>
+              <a:rPr lang="en-US" altLang="ko-KR" sz="1000" dirty="0" err="1" smtClean="0"/>
+              <a:t>TotalProcessorTime</a:t>
+            </a:r>
+            <a:r>
+              <a:rPr lang="en-US" altLang="ko-KR" sz="1000" dirty="0" smtClean="0"/>
+              <a:t> : " + </a:t>
+            </a:r>
+            <a:r>
+              <a:rPr lang="en-US" altLang="ko-KR" sz="1000" dirty="0" err="1" smtClean="0"/>
+              <a:t>thisProc.TotalProcessorTime</a:t>
+            </a:r>
+            <a:r>
+              <a:rPr lang="en-US" altLang="ko-KR" sz="1000" dirty="0" smtClean="0"/>
+              <a:t>); </a:t>
+            </a:r>
+            <a:br>
+              <a:rPr lang="en-US" altLang="ko-KR" sz="1000" dirty="0" smtClean="0"/>
+            </a:br>
+            <a:r>
+              <a:rPr lang="en-US" altLang="ko-KR" sz="1000" dirty="0" smtClean="0"/>
+              <a:t>    </a:t>
+            </a:r>
+            <a:r>
+              <a:rPr lang="en-US" altLang="ko-KR" sz="1000" dirty="0" err="1" smtClean="0"/>
+              <a:t>Console.WriteLine</a:t>
+            </a:r>
+            <a:r>
+              <a:rPr lang="en-US" altLang="ko-KR" sz="1000" dirty="0" smtClean="0"/>
+              <a:t>("</a:t>
+            </a:r>
+            <a:r>
+              <a:rPr lang="en-US" altLang="ko-KR" sz="1000" dirty="0" err="1" smtClean="0"/>
+              <a:t>UserProcessorTime</a:t>
+            </a:r>
+            <a:r>
+              <a:rPr lang="en-US" altLang="ko-KR" sz="1000" dirty="0" smtClean="0"/>
+              <a:t> : " + </a:t>
+            </a:r>
+            <a:r>
+              <a:rPr lang="en-US" altLang="ko-KR" sz="1000" dirty="0" err="1" smtClean="0"/>
+              <a:t>thisProc.UserProcessorTime</a:t>
+            </a:r>
+            <a:r>
+              <a:rPr lang="en-US" altLang="ko-KR" sz="1000" dirty="0" smtClean="0"/>
+              <a:t>); </a:t>
+            </a:r>
+            <a:br>
+              <a:rPr lang="en-US" altLang="ko-KR" sz="1000" dirty="0" smtClean="0"/>
+            </a:br>
+            <a:r>
+              <a:rPr lang="en-US" altLang="ko-KR" sz="1000" dirty="0" smtClean="0"/>
+              <a:t>    </a:t>
+            </a:r>
+            <a:r>
+              <a:rPr lang="en-US" altLang="ko-KR" sz="1000" dirty="0" err="1" smtClean="0"/>
+              <a:t>Console.WriteLine</a:t>
+            </a:r>
+            <a:r>
+              <a:rPr lang="en-US" altLang="ko-KR" sz="1000" dirty="0" smtClean="0"/>
+              <a:t>("VirtualMemorySize64 : " + thisProc.VirtualMemorySize64); </a:t>
+            </a:r>
+            <a:br>
+              <a:rPr lang="en-US" altLang="ko-KR" sz="1000" dirty="0" smtClean="0"/>
+            </a:br>
+            <a:r>
+              <a:rPr lang="en-US" altLang="ko-KR" sz="1000" dirty="0" smtClean="0"/>
+              <a:t>    </a:t>
+            </a:r>
+            <a:r>
+              <a:rPr lang="en-US" altLang="ko-KR" sz="1000" dirty="0" err="1" smtClean="0"/>
+              <a:t>Console.WriteLine</a:t>
+            </a:r>
+            <a:r>
+              <a:rPr lang="en-US" altLang="ko-KR" sz="1000" dirty="0" smtClean="0"/>
+              <a:t>("WorkingSet64 : " + </a:t>
+            </a:r>
+            <a:r>
+              <a:rPr lang="en-US" altLang="ko-KR" sz="1000" b="1" dirty="0" smtClean="0"/>
+              <a:t>thisProc.WorkingSet64</a:t>
+            </a:r>
+            <a:r>
+              <a:rPr lang="en-US" altLang="ko-KR" sz="1000" dirty="0" smtClean="0"/>
+              <a:t>); // </a:t>
+            </a:r>
+            <a:r>
+              <a:rPr lang="en-US" altLang="ko-KR" sz="1000" dirty="0" err="1" smtClean="0"/>
+              <a:t>tasklist</a:t>
+            </a:r>
+            <a:r>
+              <a:rPr lang="ko-KR" altLang="en-US" sz="1000" dirty="0" smtClean="0"/>
+              <a:t>에서 </a:t>
+            </a:r>
+            <a:r>
+              <a:rPr lang="ko-KR" altLang="en-US" sz="1000" dirty="0" smtClean="0"/>
+              <a:t>보이는 메모리 사용량</a:t>
+            </a:r>
+            <a:br>
+              <a:rPr lang="ko-KR" altLang="en-US" sz="1000" dirty="0" smtClean="0"/>
+            </a:br>
+            <a:r>
+              <a:rPr lang="ko-KR" altLang="en-US" sz="1000" dirty="0" smtClean="0"/>
+              <a:t>    </a:t>
+            </a:r>
+            <a:r>
+              <a:rPr lang="en-US" altLang="ko-KR" sz="1000" dirty="0" err="1" smtClean="0"/>
+              <a:t>Console.WriteLine</a:t>
+            </a:r>
+            <a:r>
+              <a:rPr lang="en-US" altLang="ko-KR" sz="1000" dirty="0" smtClean="0"/>
+              <a:t>(); </a:t>
+            </a:r>
+            <a:br>
+              <a:rPr lang="en-US" altLang="ko-KR" sz="1000" dirty="0" smtClean="0"/>
+            </a:br>
+            <a:r>
+              <a:rPr lang="en-US" altLang="ko-KR" sz="1000" dirty="0" smtClean="0"/>
+              <a:t> </a:t>
+            </a:r>
+            <a:r>
+              <a:rPr lang="en-US" altLang="ko-KR" sz="1000" dirty="0" smtClean="0"/>
+              <a:t>}</a:t>
+            </a:r>
+            <a:endParaRPr lang="ko-KR" altLang="en-US" sz="1000" dirty="0"/>
+          </a:p>
+        </p:txBody>
+      </p:sp>
+    </p:spTree>
+  </p:cSld>
+  <p:clrMapOvr>
+    <a:masterClrMapping/>
+  </p:clrMapOvr>
+</p:sld>
+</file>
+
+<file path=ppt/slides/slide7.xml><?xml version="1.0" encoding="utf-8"?>
+<p:sld xmlns:a="http://schemas.openxmlformats.org/drawingml/2006/main" xmlns:r="http://schemas.openxmlformats.org/officeDocument/2006/relationships" xmlns:p="http://schemas.openxmlformats.org/presentationml/2006/main">
+  <p:cSld>
+    <p:spTree>
+      <p:nvGrpSpPr>
+        <p:cNvPr id="1" name=""/>
+        <p:cNvGrpSpPr/>
+        <p:nvPr/>
+      </p:nvGrpSpPr>
+      <p:grpSpPr>
+        <a:xfrm>
+          <a:off x="0" y="0"/>
+          <a:ext cx="0" cy="0"/>
+          <a:chOff x="0" y="0"/>
+          <a:chExt cx="0" cy="0"/>
+        </a:xfrm>
+      </p:grpSpPr>
+      <p:sp>
+        <p:nvSpPr>
+          <p:cNvPr id="4" name="직사각형 3"/>
+          <p:cNvSpPr/>
+          <p:nvPr/>
+        </p:nvSpPr>
+        <p:spPr>
+          <a:xfrm>
+            <a:off x="395536" y="548680"/>
+            <a:ext cx="6120680" cy="2862322"/>
+          </a:xfrm>
+          <a:prstGeom prst="rect">
+            <a:avLst/>
+          </a:prstGeom>
+        </p:spPr>
+        <p:txBody>
+          <a:bodyPr wrap="square">
+            <a:spAutoFit/>
+          </a:bodyPr>
+          <a:lstStyle/>
+          <a:p>
+            <a:pPr>
+              <a:buFont typeface="Wingdings" pitchFamily="2" charset="2"/>
+              <a:buChar char="u"/>
+            </a:pPr>
+            <a:r>
+              <a:rPr lang="ko-KR" altLang="en-US" sz="1000" dirty="0" smtClean="0"/>
+              <a:t> 파일 속성</a:t>
+            </a:r>
+            <a:endParaRPr lang="en-US" altLang="ko-KR" sz="1000" dirty="0" smtClean="0"/>
+          </a:p>
+          <a:p>
+            <a:r>
+              <a:rPr lang="en-US" altLang="ko-KR" sz="1000" dirty="0" err="1" smtClean="0"/>
+              <a:t>FileInfo</a:t>
+            </a:r>
+            <a:r>
+              <a:rPr lang="en-US" altLang="ko-KR" sz="1000" dirty="0" smtClean="0"/>
+              <a:t> </a:t>
+            </a:r>
+            <a:r>
+              <a:rPr lang="en-US" altLang="ko-KR" sz="1000" dirty="0" err="1" smtClean="0"/>
+              <a:t>fi</a:t>
+            </a:r>
+            <a:r>
+              <a:rPr lang="en-US" altLang="ko-KR" sz="1000" dirty="0" smtClean="0"/>
+              <a:t> = new </a:t>
+            </a:r>
+            <a:r>
+              <a:rPr lang="en-US" altLang="ko-KR" sz="1000" dirty="0" err="1" smtClean="0"/>
+              <a:t>FileInfo</a:t>
+            </a:r>
+            <a:r>
+              <a:rPr lang="en-US" altLang="ko-KR" sz="1000" smtClean="0"/>
+              <a:t>(path);</a:t>
+            </a:r>
+            <a:endParaRPr lang="en-US" altLang="ko-KR" sz="1000" dirty="0" smtClean="0"/>
+          </a:p>
+          <a:p>
+            <a:r>
+              <a:rPr lang="ko-KR" altLang="en-US" sz="1000" dirty="0" smtClean="0"/>
+              <a:t>파일 존재 여부 </a:t>
+            </a:r>
+            <a:r>
+              <a:rPr lang="en-US" altLang="ko-KR" sz="1000" dirty="0" smtClean="0"/>
+              <a:t>: </a:t>
+            </a:r>
+            <a:r>
+              <a:rPr lang="en-US" altLang="ko-KR" sz="1000" dirty="0" err="1" smtClean="0"/>
+              <a:t>fi.Exists</a:t>
+            </a:r>
+            <a:endParaRPr lang="en-US" altLang="ko-KR" sz="1000" dirty="0" smtClean="0"/>
+          </a:p>
+          <a:p>
+            <a:r>
+              <a:rPr lang="ko-KR" altLang="en-US" sz="1000" dirty="0" smtClean="0"/>
+              <a:t>파일 크기 </a:t>
+            </a:r>
+            <a:r>
+              <a:rPr lang="en-US" altLang="ko-KR" sz="1000" dirty="0" smtClean="0"/>
+              <a:t>: </a:t>
+            </a:r>
+            <a:r>
+              <a:rPr lang="en-US" altLang="ko-KR" sz="1000" dirty="0" err="1" smtClean="0"/>
+              <a:t>fi.Length</a:t>
+            </a:r>
+            <a:endParaRPr lang="en-US" altLang="ko-KR" sz="1000" dirty="0" smtClean="0"/>
+          </a:p>
+          <a:p>
+            <a:endParaRPr lang="en-US" altLang="ko-KR" sz="1000" dirty="0" smtClean="0"/>
+          </a:p>
+          <a:p>
+            <a:pPr>
+              <a:buFont typeface="Wingdings" pitchFamily="2" charset="2"/>
+              <a:buChar char="u"/>
+            </a:pPr>
+            <a:r>
+              <a:rPr lang="ko-KR" altLang="en-US" sz="1000" dirty="0" smtClean="0"/>
+              <a:t> 파일 </a:t>
+            </a:r>
+            <a:r>
+              <a:rPr lang="en-US" altLang="ko-KR" sz="1000" dirty="0" smtClean="0"/>
+              <a:t>Append</a:t>
+            </a:r>
+            <a:r>
+              <a:rPr lang="ko-KR" altLang="en-US" sz="1000" dirty="0" smtClean="0"/>
+              <a:t>로 쓰</a:t>
+            </a:r>
+            <a:r>
+              <a:rPr lang="ko-KR" altLang="en-US" sz="1000" dirty="0" smtClean="0"/>
+              <a:t>기</a:t>
+            </a:r>
+            <a:endParaRPr lang="en-US" altLang="ko-KR" sz="1000" dirty="0" smtClean="0"/>
+          </a:p>
+          <a:p>
+            <a:r>
+              <a:rPr lang="en-US" altLang="ko-KR" sz="1000" dirty="0" err="1" smtClean="0"/>
+              <a:t>StreamWriter</a:t>
+            </a:r>
+            <a:r>
+              <a:rPr lang="en-US" altLang="ko-KR" sz="1000" dirty="0" smtClean="0"/>
+              <a:t> </a:t>
+            </a:r>
+            <a:r>
+              <a:rPr lang="en-US" altLang="ko-KR" sz="1000" dirty="0" err="1" smtClean="0"/>
+              <a:t>sw</a:t>
+            </a:r>
+            <a:r>
+              <a:rPr lang="en-US" altLang="ko-KR" sz="1000" dirty="0" smtClean="0"/>
+              <a:t> = new </a:t>
+            </a:r>
+            <a:r>
+              <a:rPr lang="en-US" altLang="ko-KR" sz="1000" dirty="0" err="1" smtClean="0"/>
+              <a:t>StreamWriter</a:t>
+            </a:r>
+            <a:r>
+              <a:rPr lang="en-US" altLang="ko-KR" sz="1000" dirty="0" smtClean="0"/>
+              <a:t>(path, true);</a:t>
+            </a:r>
+          </a:p>
+          <a:p>
+            <a:r>
+              <a:rPr lang="en-US" altLang="ko-KR" sz="1000" dirty="0" err="1" smtClean="0"/>
+              <a:t>sw.WriteLine</a:t>
+            </a:r>
+            <a:r>
+              <a:rPr lang="en-US" altLang="ko-KR" sz="1000" dirty="0" smtClean="0"/>
+              <a:t>(line</a:t>
+            </a:r>
+            <a:r>
+              <a:rPr lang="en-US" altLang="ko-KR" sz="1000" dirty="0" smtClean="0"/>
+              <a:t>);</a:t>
+            </a:r>
+          </a:p>
+          <a:p>
+            <a:r>
+              <a:rPr lang="en-US" altLang="ko-KR" sz="1000" dirty="0" err="1" smtClean="0"/>
+              <a:t>sw.Close</a:t>
+            </a:r>
+            <a:r>
+              <a:rPr lang="en-US" altLang="ko-KR" sz="1000" dirty="0" smtClean="0"/>
+              <a:t>();</a:t>
+            </a:r>
+          </a:p>
+          <a:p>
+            <a:endParaRPr lang="en-US" altLang="ko-KR" sz="1000" dirty="0" smtClean="0"/>
+          </a:p>
+          <a:p>
+            <a:pPr>
+              <a:buFont typeface="Wingdings" pitchFamily="2" charset="2"/>
+              <a:buChar char="u"/>
+            </a:pPr>
+            <a:r>
+              <a:rPr lang="ko-KR" altLang="en-US" sz="1000" dirty="0" smtClean="0"/>
+              <a:t> 문자열 공백 단위로 나누기 </a:t>
+            </a:r>
+            <a:endParaRPr lang="en-US" altLang="ko-KR" sz="1000" dirty="0" smtClean="0"/>
+          </a:p>
+          <a:p>
+            <a:r>
+              <a:rPr lang="en-US" altLang="ko-KR" sz="1000" dirty="0" smtClean="0"/>
+              <a:t>char[] delimiter = { ' ' };</a:t>
+            </a:r>
+          </a:p>
+          <a:p>
+            <a:r>
+              <a:rPr lang="en-US" altLang="ko-KR" sz="1000" dirty="0" smtClean="0"/>
+              <a:t>string</a:t>
+            </a:r>
+            <a:r>
+              <a:rPr lang="en-US" altLang="ko-KR" sz="1000" dirty="0" smtClean="0"/>
+              <a:t>[] </a:t>
+            </a:r>
+            <a:r>
+              <a:rPr lang="en-US" altLang="ko-KR" sz="1000" dirty="0" err="1" smtClean="0"/>
+              <a:t>strWords</a:t>
+            </a:r>
+            <a:r>
+              <a:rPr lang="en-US" altLang="ko-KR" sz="1000" dirty="0" smtClean="0"/>
+              <a:t> = </a:t>
+            </a:r>
+            <a:r>
+              <a:rPr lang="en-US" altLang="ko-KR" sz="1000" dirty="0" err="1" smtClean="0"/>
+              <a:t>line.</a:t>
+            </a:r>
+            <a:r>
+              <a:rPr lang="en-US" altLang="ko-KR" sz="1000" b="1" dirty="0" err="1" smtClean="0"/>
+              <a:t>Split</a:t>
+            </a:r>
+            <a:r>
+              <a:rPr lang="en-US" altLang="ko-KR" sz="1000" dirty="0" smtClean="0"/>
+              <a:t>(delimiter, </a:t>
+            </a:r>
+            <a:r>
+              <a:rPr lang="en-US" altLang="ko-KR" sz="1000" b="1" dirty="0" err="1" smtClean="0"/>
+              <a:t>StringSplitOptions.RemoveEmptyEntries</a:t>
+            </a:r>
+            <a:r>
+              <a:rPr lang="en-US" altLang="ko-KR" sz="1000" dirty="0" smtClean="0"/>
+              <a:t>);</a:t>
+            </a:r>
+          </a:p>
+          <a:p>
+            <a:endParaRPr lang="en-US" altLang="ko-KR" sz="1000" dirty="0" smtClean="0"/>
+          </a:p>
+          <a:p>
+            <a:pPr>
+              <a:buFont typeface="Wingdings" pitchFamily="2" charset="2"/>
+              <a:buChar char="u"/>
+            </a:pPr>
+            <a:r>
+              <a:rPr lang="en-US" altLang="ko-KR" sz="1000" dirty="0" smtClean="0"/>
+              <a:t> Create </a:t>
+            </a:r>
+            <a:r>
+              <a:rPr lang="en-US" altLang="ko-KR" sz="1000" dirty="0" smtClean="0"/>
+              <a:t>Thread</a:t>
+            </a:r>
+          </a:p>
+          <a:p>
+            <a:r>
+              <a:rPr lang="en-US" altLang="ko-KR" sz="1000" dirty="0" err="1" smtClean="0"/>
+              <a:t>ThreadLogic</a:t>
+            </a:r>
+            <a:r>
+              <a:rPr lang="en-US" altLang="ko-KR" sz="1000" dirty="0" smtClean="0"/>
+              <a:t> </a:t>
+            </a:r>
+            <a:r>
+              <a:rPr lang="en-US" altLang="ko-KR" sz="1000" dirty="0" err="1" smtClean="0"/>
+              <a:t>th</a:t>
+            </a:r>
+            <a:r>
+              <a:rPr lang="en-US" altLang="ko-KR" sz="1000" dirty="0" smtClean="0"/>
+              <a:t> = new </a:t>
+            </a:r>
+            <a:r>
+              <a:rPr lang="en-US" altLang="ko-KR" sz="1000" dirty="0" err="1" smtClean="0"/>
+              <a:t>ThreadLogic</a:t>
+            </a:r>
+            <a:r>
+              <a:rPr lang="en-US" altLang="ko-KR" sz="1000" dirty="0" smtClean="0"/>
+              <a:t>();</a:t>
+            </a:r>
+          </a:p>
+          <a:p>
+            <a:r>
+              <a:rPr lang="en-US" altLang="ko-KR" sz="1000" dirty="0" smtClean="0"/>
+              <a:t>Thread </a:t>
+            </a:r>
+            <a:r>
+              <a:rPr lang="en-US" altLang="ko-KR" sz="1000" dirty="0" err="1" smtClean="0"/>
+              <a:t>workerThread</a:t>
+            </a:r>
+            <a:r>
+              <a:rPr lang="en-US" altLang="ko-KR" sz="1000" dirty="0" smtClean="0"/>
+              <a:t> = new Thread(</a:t>
+            </a:r>
+            <a:r>
+              <a:rPr lang="en-US" altLang="ko-KR" sz="1000" dirty="0" err="1" smtClean="0"/>
+              <a:t>th.DoMonitoring</a:t>
+            </a:r>
+            <a:r>
+              <a:rPr lang="en-US" altLang="ko-KR" sz="1000" dirty="0" smtClean="0"/>
+              <a:t>);</a:t>
+            </a:r>
+          </a:p>
+          <a:p>
+            <a:r>
+              <a:rPr lang="en-US" altLang="ko-KR" sz="1000" dirty="0" err="1" smtClean="0"/>
+              <a:t>workerThread.Start</a:t>
+            </a:r>
+            <a:r>
+              <a:rPr lang="en-US" altLang="ko-KR" sz="1000" dirty="0" smtClean="0"/>
+              <a:t>();    // start</a:t>
+            </a:r>
+            <a:r>
+              <a:rPr lang="ko-KR" altLang="en-US" sz="1000" dirty="0" smtClean="0"/>
+              <a:t>함수 안에 </a:t>
+            </a:r>
+            <a:r>
+              <a:rPr lang="en-US" altLang="ko-KR" sz="1000" dirty="0" smtClean="0"/>
+              <a:t>parameter</a:t>
+            </a:r>
+            <a:r>
+              <a:rPr lang="ko-KR" altLang="en-US" sz="1000" dirty="0" smtClean="0"/>
+              <a:t>를 넣는다</a:t>
+            </a:r>
+            <a:r>
+              <a:rPr lang="en-US" altLang="ko-KR" sz="1000" dirty="0" smtClean="0"/>
+              <a:t>.</a:t>
+            </a:r>
+          </a:p>
+        </p:txBody>
+      </p:sp>
+      <p:sp>
+        <p:nvSpPr>
+          <p:cNvPr id="5" name="TextBox 4"/>
+          <p:cNvSpPr txBox="1"/>
+          <p:nvPr/>
+        </p:nvSpPr>
+        <p:spPr>
+          <a:xfrm>
+            <a:off x="6948264" y="188640"/>
+            <a:ext cx="1944216" cy="369332"/>
+          </a:xfrm>
+          <a:prstGeom prst="rect">
+            <a:avLst/>
+          </a:prstGeom>
+          <a:noFill/>
+          <a:ln>
+            <a:solidFill>
+              <a:schemeClr val="tx1"/>
+            </a:solidFill>
+          </a:ln>
+        </p:spPr>
+        <p:txBody>
+          <a:bodyPr wrap="square" rtlCol="0">
+            <a:spAutoFit/>
+          </a:bodyPr>
+          <a:lstStyle/>
+          <a:p>
+            <a:pPr algn="ctr"/>
+            <a:r>
+              <a:rPr lang="ko-KR" altLang="en-US" dirty="0" smtClean="0"/>
+              <a:t>주요 </a:t>
+            </a:r>
+            <a:r>
+              <a:rPr lang="en-US" altLang="ko-KR" dirty="0" smtClean="0"/>
+              <a:t>API</a:t>
+            </a:r>
+            <a:endParaRPr lang="ko-KR" altLang="en-US" dirty="0"/>
           </a:p>
         </p:txBody>
       </p:sp>

</xml_diff>